<commit_message>
Draft of runtimes illustration
</commit_message>
<xml_diff>
--- a/images/runtimes/OW-Runtimes.pptx
+++ b/images/runtimes/OW-Runtimes.pptx
@@ -1751,8 +1751,8 @@
         </p:blipFill>
         <p:spPr>
           <a:xfrm>
-            <a:off x="5867400" y="3200400"/>
-            <a:ext cx="1479343" cy="797140"/>
+            <a:off x="5644134" y="3400269"/>
+            <a:ext cx="1066800" cy="574842"/>
           </a:xfrm>
           <a:prstGeom prst="rect">
             <a:avLst/>
@@ -1781,8 +1781,8 @@
         </p:blipFill>
         <p:spPr>
           <a:xfrm>
-            <a:off x="4267200" y="3429000"/>
-            <a:ext cx="1379123" cy="644740"/>
+            <a:off x="4357955" y="3711424"/>
+            <a:ext cx="977969" cy="457200"/>
           </a:xfrm>
           <a:prstGeom prst="rect">
             <a:avLst/>
@@ -1811,8 +1811,98 @@
         </p:blipFill>
         <p:spPr>
           <a:xfrm>
-            <a:off x="7696200" y="3322285"/>
-            <a:ext cx="1102299" cy="675255"/>
+            <a:off x="7041629" y="3733800"/>
+            <a:ext cx="870733" cy="533400"/>
+          </a:xfrm>
+          <a:prstGeom prst="rect">
+            <a:avLst/>
+          </a:prstGeom>
+        </p:spPr>
+      </p:pic>
+      <p:pic>
+        <p:nvPicPr>
+          <p:cNvPr id="8" name="Picture 7"/>
+          <p:cNvPicPr>
+            <a:picLocks noChangeAspect="1"/>
+          </p:cNvPicPr>
+          <p:nvPr/>
+        </p:nvPicPr>
+        <p:blipFill>
+          <a:blip r:embed="rId5">
+            <a:extLst>
+              <a:ext uri="{28A0092B-C50C-407E-A947-70E740481C1C}">
+                <a14:useLocalDpi xmlns:a14="http://schemas.microsoft.com/office/drawing/2010/main" val="0"/>
+              </a:ext>
+            </a:extLst>
+          </a:blip>
+          <a:stretch>
+            <a:fillRect/>
+          </a:stretch>
+        </p:blipFill>
+        <p:spPr>
+          <a:xfrm>
+            <a:off x="5566229" y="4055427"/>
+            <a:ext cx="1170819" cy="491745"/>
+          </a:xfrm>
+          <a:prstGeom prst="rect">
+            <a:avLst/>
+          </a:prstGeom>
+        </p:spPr>
+      </p:pic>
+      <p:pic>
+        <p:nvPicPr>
+          <p:cNvPr id="10" name="Picture 9"/>
+          <p:cNvPicPr>
+            <a:picLocks noChangeAspect="1"/>
+          </p:cNvPicPr>
+          <p:nvPr/>
+        </p:nvPicPr>
+        <p:blipFill>
+          <a:blip r:embed="rId6">
+            <a:extLst>
+              <a:ext uri="{28A0092B-C50C-407E-A947-70E740481C1C}">
+                <a14:useLocalDpi xmlns:a14="http://schemas.microsoft.com/office/drawing/2010/main" val="0"/>
+              </a:ext>
+            </a:extLst>
+          </a:blip>
+          <a:stretch>
+            <a:fillRect/>
+          </a:stretch>
+        </p:blipFill>
+        <p:spPr>
+          <a:xfrm>
+            <a:off x="6733419" y="4545437"/>
+            <a:ext cx="762000" cy="401594"/>
+          </a:xfrm>
+          <a:prstGeom prst="rect">
+            <a:avLst/>
+          </a:prstGeom>
+        </p:spPr>
+      </p:pic>
+      <p:pic>
+        <p:nvPicPr>
+          <p:cNvPr id="11" name="Picture 10"/>
+          <p:cNvPicPr>
+            <a:picLocks noChangeAspect="1"/>
+          </p:cNvPicPr>
+          <p:nvPr/>
+        </p:nvPicPr>
+        <p:blipFill>
+          <a:blip r:embed="rId7">
+            <a:extLst>
+              <a:ext uri="{28A0092B-C50C-407E-A947-70E740481C1C}">
+                <a14:useLocalDpi xmlns:a14="http://schemas.microsoft.com/office/drawing/2010/main" val="0"/>
+              </a:ext>
+            </a:extLst>
+          </a:blip>
+          <a:stretch>
+            <a:fillRect/>
+          </a:stretch>
+        </p:blipFill>
+        <p:spPr>
+          <a:xfrm>
+            <a:off x="4822055" y="4627488"/>
+            <a:ext cx="1027738" cy="359708"/>
           </a:xfrm>
           <a:prstGeom prst="rect">
             <a:avLst/>

</xml_diff>

<commit_message>
Final Runtimes illustration and home page updates.
</commit_message>
<xml_diff>
--- a/images/runtimes/OW-Runtimes.pptx
+++ b/images/runtimes/OW-Runtimes.pptx
@@ -1707,6 +1707,67 @@
       </p:grpSpPr>
       <p:sp>
         <p:nvSpPr>
+          <p:cNvPr id="14" name="Rectangle 13"/>
+          <p:cNvSpPr/>
+          <p:nvPr/>
+        </p:nvSpPr>
+        <p:spPr>
+          <a:xfrm>
+            <a:off x="4184031" y="2971800"/>
+            <a:ext cx="3893169" cy="1981200"/>
+          </a:xfrm>
+          <a:prstGeom prst="rect">
+            <a:avLst/>
+          </a:prstGeom>
+          <a:solidFill>
+            <a:srgbClr val="E6F4F5">
+              <a:alpha val="80000"/>
+            </a:srgbClr>
+          </a:solidFill>
+          <a:ln>
+            <a:solidFill>
+              <a:schemeClr val="bg1">
+                <a:lumMod val="75000"/>
+                <a:alpha val="40000"/>
+              </a:schemeClr>
+            </a:solidFill>
+            <a:prstDash val="solid"/>
+          </a:ln>
+        </p:spPr>
+        <p:style>
+          <a:lnRef idx="2">
+            <a:schemeClr val="accent1">
+              <a:shade val="50000"/>
+            </a:schemeClr>
+          </a:lnRef>
+          <a:fillRef idx="1">
+            <a:schemeClr val="accent1"/>
+          </a:fillRef>
+          <a:effectRef idx="0">
+            <a:schemeClr val="accent1"/>
+          </a:effectRef>
+          <a:fontRef idx="minor">
+            <a:schemeClr val="lt1"/>
+          </a:fontRef>
+        </p:style>
+        <p:txBody>
+          <a:bodyPr wrap="none" rtlCol="0" anchor="ctr"/>
+          <a:lstStyle/>
+          <a:p>
+            <a:pPr algn="ctr"/>
+            <a:endParaRPr lang="en-US" sz="1400" smtClean="0">
+              <a:solidFill>
+                <a:schemeClr val="tx1">
+                  <a:lumMod val="85000"/>
+                  <a:lumOff val="15000"/>
+                </a:schemeClr>
+              </a:solidFill>
+            </a:endParaRPr>
+          </a:p>
+        </p:txBody>
+      </p:sp>
+      <p:sp>
+        <p:nvSpPr>
           <p:cNvPr id="2" name="Slide Number Placeholder 1"/>
           <p:cNvSpPr>
             <a:spLocks noGrp="1"/>
@@ -1751,8 +1812,8 @@
         </p:blipFill>
         <p:spPr>
           <a:xfrm>
-            <a:off x="5644134" y="3400269"/>
-            <a:ext cx="1066800" cy="574842"/>
+            <a:off x="4579155" y="4277586"/>
+            <a:ext cx="963357" cy="519102"/>
           </a:xfrm>
           <a:prstGeom prst="rect">
             <a:avLst/>
@@ -1761,7 +1822,7 @@
       </p:pic>
       <p:pic>
         <p:nvPicPr>
-          <p:cNvPr id="6" name="Picture 5"/>
+          <p:cNvPr id="7" name="Picture 6"/>
           <p:cNvPicPr>
             <a:picLocks noChangeAspect="1"/>
           </p:cNvPicPr>
@@ -1781,8 +1842,8 @@
         </p:blipFill>
         <p:spPr>
           <a:xfrm>
-            <a:off x="4357955" y="3711424"/>
-            <a:ext cx="977969" cy="457200"/>
+            <a:off x="4937627" y="3067816"/>
+            <a:ext cx="944549" cy="578619"/>
           </a:xfrm>
           <a:prstGeom prst="rect">
             <a:avLst/>
@@ -1791,7 +1852,7 @@
       </p:pic>
       <p:pic>
         <p:nvPicPr>
-          <p:cNvPr id="7" name="Picture 6"/>
+          <p:cNvPr id="8" name="Picture 7"/>
           <p:cNvPicPr>
             <a:picLocks noChangeAspect="1"/>
           </p:cNvPicPr>
@@ -1811,8 +1872,8 @@
         </p:blipFill>
         <p:spPr>
           <a:xfrm>
-            <a:off x="7041629" y="3733800"/>
-            <a:ext cx="870733" cy="533400"/>
+            <a:off x="5007241" y="3759499"/>
+            <a:ext cx="1170819" cy="491745"/>
           </a:xfrm>
           <a:prstGeom prst="rect">
             <a:avLst/>
@@ -1821,7 +1882,7 @@
       </p:pic>
       <p:pic>
         <p:nvPicPr>
-          <p:cNvPr id="8" name="Picture 7"/>
+          <p:cNvPr id="10" name="Picture 9"/>
           <p:cNvPicPr>
             <a:picLocks noChangeAspect="1"/>
           </p:cNvPicPr>
@@ -1841,8 +1902,8 @@
         </p:blipFill>
         <p:spPr>
           <a:xfrm>
-            <a:off x="5566229" y="4055427"/>
-            <a:ext cx="1170819" cy="491745"/>
+            <a:off x="6974323" y="4390242"/>
+            <a:ext cx="722657" cy="380859"/>
           </a:xfrm>
           <a:prstGeom prst="rect">
             <a:avLst/>
@@ -1851,7 +1912,7 @@
       </p:pic>
       <p:pic>
         <p:nvPicPr>
-          <p:cNvPr id="10" name="Picture 9"/>
+          <p:cNvPr id="11" name="Picture 10"/>
           <p:cNvPicPr>
             <a:picLocks noChangeAspect="1"/>
           </p:cNvPicPr>
@@ -1871,8 +1932,8 @@
         </p:blipFill>
         <p:spPr>
           <a:xfrm>
-            <a:off x="6733419" y="4545437"/>
-            <a:ext cx="762000" cy="401594"/>
+            <a:off x="6042689" y="3411375"/>
+            <a:ext cx="1027738" cy="359708"/>
           </a:xfrm>
           <a:prstGeom prst="rect">
             <a:avLst/>
@@ -1881,7 +1942,7 @@
       </p:pic>
       <p:pic>
         <p:nvPicPr>
-          <p:cNvPr id="11" name="Picture 10"/>
+          <p:cNvPr id="12" name="Picture 11"/>
           <p:cNvPicPr>
             <a:picLocks noChangeAspect="1"/>
           </p:cNvPicPr>
@@ -1901,8 +1962,224 @@
         </p:blipFill>
         <p:spPr>
           <a:xfrm>
-            <a:off x="4822055" y="4627488"/>
-            <a:ext cx="1027738" cy="359708"/>
+            <a:off x="6867545" y="3130617"/>
+            <a:ext cx="936212" cy="349182"/>
+          </a:xfrm>
+          <a:prstGeom prst="rect">
+            <a:avLst/>
+          </a:prstGeom>
+        </p:spPr>
+      </p:pic>
+      <p:grpSp>
+        <p:nvGrpSpPr>
+          <p:cNvPr id="34" name="Group 33"/>
+          <p:cNvGrpSpPr/>
+          <p:nvPr/>
+        </p:nvGrpSpPr>
+        <p:grpSpPr>
+          <a:xfrm>
+            <a:off x="3630956" y="3251795"/>
+            <a:ext cx="1190730" cy="1277292"/>
+            <a:chOff x="3394677" y="1826131"/>
+            <a:chExt cx="1290821" cy="1384659"/>
+          </a:xfrm>
+        </p:grpSpPr>
+        <p:pic>
+          <p:nvPicPr>
+            <p:cNvPr id="19" name="pasted-image.pdf" descr="pasted-image.pdf"/>
+            <p:cNvPicPr>
+              <a:picLocks noChangeAspect="1"/>
+            </p:cNvPicPr>
+            <p:nvPr/>
+          </p:nvPicPr>
+          <p:blipFill>
+            <a:blip r:embed="rId8">
+              <a:extLst>
+                <a:ext uri="{BEBA8EAE-BF5A-486C-A8C5-ECC9F3942E4B}">
+                  <a14:imgProps xmlns:a14="http://schemas.microsoft.com/office/drawing/2010/main">
+                    <a14:imgLayer r:embed="rId9">
+                      <a14:imgEffect>
+                        <a14:colorTemperature colorTemp="5093"/>
+                      </a14:imgEffect>
+                    </a14:imgLayer>
+                  </a14:imgProps>
+                </a:ext>
+              </a:extLst>
+            </a:blip>
+            <a:stretch>
+              <a:fillRect/>
+            </a:stretch>
+          </p:blipFill>
+          <p:spPr>
+            <a:xfrm>
+              <a:off x="3614704" y="1826131"/>
+              <a:ext cx="1070794" cy="1101565"/>
+            </a:xfrm>
+            <a:prstGeom prst="rect">
+              <a:avLst/>
+            </a:prstGeom>
+            <a:ln w="12700" cap="flat">
+              <a:noFill/>
+              <a:miter lim="400000"/>
+            </a:ln>
+            <a:effectLst>
+              <a:outerShdw blurRad="25400" dist="25400" dir="2700000" algn="tl" rotWithShape="0">
+                <a:prstClr val="black">
+                  <a:alpha val="40000"/>
+                </a:prstClr>
+              </a:outerShdw>
+            </a:effectLst>
+          </p:spPr>
+        </p:pic>
+        <p:pic>
+          <p:nvPicPr>
+            <p:cNvPr id="20" name="pasted-image.pdf" descr="pasted-image.pdf"/>
+            <p:cNvPicPr>
+              <a:picLocks noChangeAspect="1"/>
+            </p:cNvPicPr>
+            <p:nvPr/>
+          </p:nvPicPr>
+          <p:blipFill>
+            <a:blip r:embed="rId8">
+              <a:extLst>
+                <a:ext uri="{BEBA8EAE-BF5A-486C-A8C5-ECC9F3942E4B}">
+                  <a14:imgProps xmlns:a14="http://schemas.microsoft.com/office/drawing/2010/main">
+                    <a14:imgLayer r:embed="rId9">
+                      <a14:imgEffect>
+                        <a14:colorTemperature colorTemp="5093"/>
+                      </a14:imgEffect>
+                    </a14:imgLayer>
+                  </a14:imgProps>
+                </a:ext>
+              </a:extLst>
+            </a:blip>
+            <a:stretch>
+              <a:fillRect/>
+            </a:stretch>
+          </p:blipFill>
+          <p:spPr>
+            <a:xfrm>
+              <a:off x="3494416" y="1978783"/>
+              <a:ext cx="1070794" cy="1101565"/>
+            </a:xfrm>
+            <a:prstGeom prst="rect">
+              <a:avLst/>
+            </a:prstGeom>
+            <a:ln w="12700" cap="flat">
+              <a:noFill/>
+              <a:miter lim="400000"/>
+            </a:ln>
+            <a:effectLst>
+              <a:outerShdw blurRad="25400" dist="25400" dir="2700000" algn="tl" rotWithShape="0">
+                <a:prstClr val="black">
+                  <a:alpha val="40000"/>
+                </a:prstClr>
+              </a:outerShdw>
+            </a:effectLst>
+          </p:spPr>
+        </p:pic>
+        <p:pic>
+          <p:nvPicPr>
+            <p:cNvPr id="21" name="pasted-image.pdf" descr="pasted-image.pdf"/>
+            <p:cNvPicPr>
+              <a:picLocks noChangeAspect="1"/>
+            </p:cNvPicPr>
+            <p:nvPr/>
+          </p:nvPicPr>
+          <p:blipFill>
+            <a:blip r:embed="rId8">
+              <a:extLst>
+                <a:ext uri="{BEBA8EAE-BF5A-486C-A8C5-ECC9F3942E4B}">
+                  <a14:imgProps xmlns:a14="http://schemas.microsoft.com/office/drawing/2010/main">
+                    <a14:imgLayer r:embed="rId9">
+                      <a14:imgEffect>
+                        <a14:colorTemperature colorTemp="5093"/>
+                      </a14:imgEffect>
+                    </a14:imgLayer>
+                  </a14:imgProps>
+                </a:ext>
+              </a:extLst>
+            </a:blip>
+            <a:stretch>
+              <a:fillRect/>
+            </a:stretch>
+          </p:blipFill>
+          <p:spPr>
+            <a:xfrm>
+              <a:off x="3394677" y="2109225"/>
+              <a:ext cx="1070794" cy="1101565"/>
+            </a:xfrm>
+            <a:prstGeom prst="rect">
+              <a:avLst/>
+            </a:prstGeom>
+            <a:ln w="12700" cap="flat">
+              <a:noFill/>
+              <a:miter lim="400000"/>
+            </a:ln>
+            <a:effectLst>
+              <a:outerShdw blurRad="25400" dist="25400" dir="2700000" algn="tl" rotWithShape="0">
+                <a:prstClr val="black">
+                  <a:alpha val="40000"/>
+                </a:prstClr>
+              </a:outerShdw>
+            </a:effectLst>
+          </p:spPr>
+        </p:pic>
+      </p:grpSp>
+      <p:pic>
+        <p:nvPicPr>
+          <p:cNvPr id="35" name="Picture 34"/>
+          <p:cNvPicPr>
+            <a:picLocks noChangeAspect="1"/>
+          </p:cNvPicPr>
+          <p:nvPr/>
+        </p:nvPicPr>
+        <p:blipFill>
+          <a:blip r:embed="rId10">
+            <a:extLst>
+              <a:ext uri="{28A0092B-C50C-407E-A947-70E740481C1C}">
+                <a14:useLocalDpi xmlns:a14="http://schemas.microsoft.com/office/drawing/2010/main" val="0"/>
+              </a:ext>
+            </a:extLst>
+          </a:blip>
+          <a:stretch>
+            <a:fillRect/>
+          </a:stretch>
+        </p:blipFill>
+        <p:spPr>
+          <a:xfrm>
+            <a:off x="5892621" y="4251244"/>
+            <a:ext cx="889956" cy="416054"/>
+          </a:xfrm>
+          <a:prstGeom prst="rect">
+            <a:avLst/>
+          </a:prstGeom>
+        </p:spPr>
+      </p:pic>
+      <p:pic>
+        <p:nvPicPr>
+          <p:cNvPr id="37" name="Picture 36"/>
+          <p:cNvPicPr>
+            <a:picLocks noChangeAspect="1"/>
+          </p:cNvPicPr>
+          <p:nvPr/>
+        </p:nvPicPr>
+        <p:blipFill>
+          <a:blip r:embed="rId11">
+            <a:extLst>
+              <a:ext uri="{28A0092B-C50C-407E-A947-70E740481C1C}">
+                <a14:useLocalDpi xmlns:a14="http://schemas.microsoft.com/office/drawing/2010/main" val="0"/>
+              </a:ext>
+            </a:extLst>
+          </a:blip>
+          <a:stretch>
+            <a:fillRect/>
+          </a:stretch>
+        </p:blipFill>
+        <p:spPr>
+          <a:xfrm>
+            <a:off x="6518133" y="3851119"/>
+            <a:ext cx="1363881" cy="324591"/>
           </a:xfrm>
           <a:prstGeom prst="rect">
             <a:avLst/>

</xml_diff>